<commit_message>
form m1 no s2
</commit_message>
<xml_diff>
--- a/docs/modulos/02-modelo-de-camera/slides.pptx
+++ b/docs/modulos/02-modelo-de-camera/slides.pptx
@@ -6,7 +6,7 @@
     <p:sldMasterId id="2147483664" r:id="rId2"/>
   </p:sldMasterIdLst>
   <p:notesMasterIdLst>
-    <p:notesMasterId r:id="rId19"/>
+    <p:notesMasterId r:id="rId20"/>
   </p:notesMasterIdLst>
   <p:sldIdLst>
     <p:sldId id="256" r:id="rId3"/>
@@ -25,6 +25,7 @@
     <p:sldId id="267" r:id="rId16"/>
     <p:sldId id="268" r:id="rId17"/>
     <p:sldId id="282" r:id="rId18"/>
+    <p:sldId id="291" r:id="rId19"/>
   </p:sldIdLst>
   <p:sldSz cx="9144000" cy="6858000" type="screen4x3"/>
   <p:notesSz cx="9144000" cy="6858000"/>
@@ -224,7 +225,7 @@
           <a:p>
             <a:fld id="{DEC1326A-6B39-45E7-A0ED-86877A2CBE97}" type="datetimeFigureOut">
               <a:rPr lang="pt-BR" smtClean="0"/>
-              <a:t>26/08/2023</a:t>
+              <a:t>27/08/2023</a:t>
             </a:fld>
             <a:endParaRPr lang="pt-BR"/>
           </a:p>
@@ -1271,7 +1272,7 @@
             </a:pPr>
             <a:fld id="{F2B7900D-0734-4F15-9F08-6F03FB6F6514}" type="datetimeFigureOut">
               <a:rPr lang="pt-BR"/>
-              <a:t>26/08/2023</a:t>
+              <a:t>27/08/2023</a:t>
             </a:fld>
             <a:endParaRPr lang="pt-BR"/>
           </a:p>
@@ -2888,7 +2889,7 @@
             </a:pPr>
             <a:fld id="{9D3A6509-23EB-4B44-A528-7D90D9904DC9}" type="datetime1">
               <a:rPr lang="en-US"/>
-              <a:t>26-Aug-23</a:t>
+              <a:t>27-Aug-23</a:t>
             </a:fld>
             <a:endParaRPr lang="en-US"/>
           </a:p>
@@ -3455,7 +3456,7 @@
             </a:pPr>
             <a:fld id="{9D3A6509-23EB-4B44-A528-7D90D9904DC9}" type="datetime1">
               <a:rPr lang="en-US"/>
-              <a:t>26-Aug-23</a:t>
+              <a:t>27-Aug-23</a:t>
             </a:fld>
             <a:endParaRPr lang="en-US"/>
           </a:p>
@@ -3984,7 +3985,7 @@
             </a:pPr>
             <a:fld id="{9D3A6509-23EB-4B44-A528-7D90D9904DC9}" type="datetime1">
               <a:rPr lang="en-US"/>
-              <a:t>26-Aug-23</a:t>
+              <a:t>27-Aug-23</a:t>
             </a:fld>
             <a:endParaRPr lang="en-US"/>
           </a:p>
@@ -4604,7 +4605,7 @@
             </a:pPr>
             <a:fld id="{9D3A6509-23EB-4B44-A528-7D90D9904DC9}" type="datetime1">
               <a:rPr lang="en-US"/>
-              <a:t>26-Aug-23</a:t>
+              <a:t>27-Aug-23</a:t>
             </a:fld>
             <a:endParaRPr lang="en-US"/>
           </a:p>
@@ -5174,7 +5175,7 @@
             </a:pPr>
             <a:fld id="{9D3A6509-23EB-4B44-A528-7D90D9904DC9}" type="datetime1">
               <a:rPr lang="en-US"/>
-              <a:t>26-Aug-23</a:t>
+              <a:t>27-Aug-23</a:t>
             </a:fld>
             <a:endParaRPr lang="en-US"/>
           </a:p>
@@ -5515,7 +5516,7 @@
             </a:pPr>
             <a:fld id="{9D3A6509-23EB-4B44-A528-7D90D9904DC9}" type="datetime1">
               <a:rPr lang="en-US"/>
-              <a:t>26-Aug-23</a:t>
+              <a:t>27-Aug-23</a:t>
             </a:fld>
             <a:endParaRPr lang="en-US"/>
           </a:p>
@@ -5723,7 +5724,7 @@
             </a:pPr>
             <a:fld id="{5B4B5584-C7FA-470F-8EC2-A30435A4DF16}" type="datetime1">
               <a:rPr lang="en-US"/>
-              <a:t>26-Aug-23</a:t>
+              <a:t>27-Aug-23</a:t>
             </a:fld>
             <a:endParaRPr lang="en-US"/>
           </a:p>
@@ -5827,7 +5828,7 @@
             </a:pPr>
             <a:fld id="{F2B7900D-0734-4F15-9F08-6F03FB6F6514}" type="datetimeFigureOut">
               <a:rPr lang="pt-BR"/>
-              <a:t>26/08/2023</a:t>
+              <a:t>27/08/2023</a:t>
             </a:fld>
             <a:endParaRPr lang="pt-BR"/>
           </a:p>
@@ -6351,7 +6352,7 @@
             </a:pPr>
             <a:fld id="{F2B7900D-0734-4F15-9F08-6F03FB6F6514}" type="datetimeFigureOut">
               <a:rPr lang="pt-BR"/>
-              <a:t>26/08/2023</a:t>
+              <a:t>27/08/2023</a:t>
             </a:fld>
             <a:endParaRPr lang="pt-BR"/>
           </a:p>
@@ -6729,7 +6730,7 @@
             </a:pPr>
             <a:fld id="{F2B7900D-0734-4F15-9F08-6F03FB6F6514}" type="datetimeFigureOut">
               <a:rPr lang="pt-BR"/>
-              <a:t>26/08/2023</a:t>
+              <a:t>27/08/2023</a:t>
             </a:fld>
             <a:endParaRPr lang="pt-BR"/>
           </a:p>
@@ -7294,7 +7295,7 @@
             </a:pPr>
             <a:fld id="{F2B7900D-0734-4F15-9F08-6F03FB6F6514}" type="datetimeFigureOut">
               <a:rPr lang="pt-BR"/>
-              <a:t>26/08/2023</a:t>
+              <a:t>27/08/2023</a:t>
             </a:fld>
             <a:endParaRPr lang="pt-BR"/>
           </a:p>
@@ -7630,7 +7631,7 @@
             </a:pPr>
             <a:fld id="{3135726F-7445-4038-9FAC-4112A5F2E72B}" type="datetimeFigureOut">
               <a:rPr lang="en-US"/>
-              <a:t>26-Aug-23</a:t>
+              <a:t>27-Aug-23</a:t>
             </a:fld>
             <a:endParaRPr lang="en-US"/>
           </a:p>
@@ -8172,7 +8173,7 @@
             </a:pPr>
             <a:fld id="{F2B7900D-0734-4F15-9F08-6F03FB6F6514}" type="datetimeFigureOut">
               <a:rPr lang="pt-BR"/>
-              <a:t>26/08/2023</a:t>
+              <a:t>27/08/2023</a:t>
             </a:fld>
             <a:endParaRPr lang="pt-BR"/>
           </a:p>
@@ -8666,7 +8667,7 @@
             </a:pPr>
             <a:fld id="{9D3A6509-23EB-4B44-A528-7D90D9904DC9}" type="datetime1">
               <a:rPr lang="en-US"/>
-              <a:t>26-Aug-23</a:t>
+              <a:t>27-Aug-23</a:t>
             </a:fld>
             <a:endParaRPr lang="en-US"/>
           </a:p>
@@ -11207,6 +11208,281 @@
 </p:sld>
 </file>
 
+<file path=ppt/slides/slide17.xml><?xml version="1.0" encoding="utf-8"?>
+<p:sld xmlns:a="http://schemas.openxmlformats.org/drawingml/2006/main" xmlns:r="http://schemas.openxmlformats.org/officeDocument/2006/relationships" xmlns:p="http://schemas.openxmlformats.org/presentationml/2006/main">
+  <p:cSld>
+    <p:spTree>
+      <p:nvGrpSpPr>
+        <p:cNvPr id="1" name=""/>
+        <p:cNvGrpSpPr/>
+        <p:nvPr/>
+      </p:nvGrpSpPr>
+      <p:grpSpPr>
+        <a:xfrm>
+          <a:off x="0" y="0"/>
+          <a:ext cx="0" cy="0"/>
+          <a:chOff x="0" y="0"/>
+          <a:chExt cx="0" cy="0"/>
+        </a:xfrm>
+      </p:grpSpPr>
+      <p:sp>
+        <p:nvSpPr>
+          <p:cNvPr id="2" name="Título 1">
+            <a:extLst>
+              <a:ext uri="{FF2B5EF4-FFF2-40B4-BE49-F238E27FC236}">
+                <a16:creationId xmlns:a16="http://schemas.microsoft.com/office/drawing/2014/main" id="{4716A649-AACE-6DC0-9774-103B4170F9CF}"/>
+              </a:ext>
+            </a:extLst>
+          </p:cNvPr>
+          <p:cNvSpPr>
+            <a:spLocks noGrp="1"/>
+          </p:cNvSpPr>
+          <p:nvPr>
+            <p:ph type="title"/>
+          </p:nvPr>
+        </p:nvSpPr>
+        <p:spPr/>
+        <p:txBody>
+          <a:bodyPr/>
+          <a:lstStyle/>
+          <a:p>
+            <a:r>
+              <a:rPr lang="pt-BR" b="1" dirty="0"/>
+              <a:t>Formulário de Avaliação do Modulo 1</a:t>
+            </a:r>
+          </a:p>
+        </p:txBody>
+      </p:sp>
+      <p:sp>
+        <p:nvSpPr>
+          <p:cNvPr id="3" name="Espaço Reservado para Texto 2">
+            <a:extLst>
+              <a:ext uri="{FF2B5EF4-FFF2-40B4-BE49-F238E27FC236}">
+                <a16:creationId xmlns:a16="http://schemas.microsoft.com/office/drawing/2014/main" id="{DCC46212-E42D-13EE-792F-4DCCCD122CD2}"/>
+              </a:ext>
+            </a:extLst>
+          </p:cNvPr>
+          <p:cNvSpPr>
+            <a:spLocks noGrp="1"/>
+          </p:cNvSpPr>
+          <p:nvPr>
+            <p:ph type="body" sz="quarter" idx="13"/>
+          </p:nvPr>
+        </p:nvSpPr>
+        <p:spPr/>
+        <p:txBody>
+          <a:bodyPr/>
+          <a:lstStyle/>
+          <a:p>
+            <a:endParaRPr lang="pt-BR"/>
+          </a:p>
+        </p:txBody>
+      </p:sp>
+      <p:sp>
+        <p:nvSpPr>
+          <p:cNvPr id="6" name="Espaço Reservado para Número de Slide 5">
+            <a:extLst>
+              <a:ext uri="{FF2B5EF4-FFF2-40B4-BE49-F238E27FC236}">
+                <a16:creationId xmlns:a16="http://schemas.microsoft.com/office/drawing/2014/main" id="{67F91034-3CAB-BCF5-8208-7FE0BFE3AC39}"/>
+              </a:ext>
+            </a:extLst>
+          </p:cNvPr>
+          <p:cNvSpPr>
+            <a:spLocks noGrp="1"/>
+          </p:cNvSpPr>
+          <p:nvPr>
+            <p:ph type="sldNum" sz="quarter" idx="12"/>
+          </p:nvPr>
+        </p:nvSpPr>
+        <p:spPr/>
+        <p:txBody>
+          <a:bodyPr/>
+          <a:lstStyle/>
+          <a:p>
+            <a:pPr>
+              <a:defRPr/>
+            </a:pPr>
+            <a:fld id="{FA3AAB12-BB6E-1B4F-AF2F-E6C37C68B919}" type="slidenum">
+              <a:rPr lang="en-US" smtClean="0"/>
+              <a:t>17</a:t>
+            </a:fld>
+            <a:endParaRPr lang="en-US"/>
+          </a:p>
+        </p:txBody>
+      </p:sp>
+      <p:grpSp>
+        <p:nvGrpSpPr>
+          <p:cNvPr id="11" name="Agrupar 10">
+            <a:extLst>
+              <a:ext uri="{FF2B5EF4-FFF2-40B4-BE49-F238E27FC236}">
+                <a16:creationId xmlns:a16="http://schemas.microsoft.com/office/drawing/2014/main" id="{4EDFB888-B906-A460-01F9-5C09A4327FE0}"/>
+              </a:ext>
+            </a:extLst>
+          </p:cNvPr>
+          <p:cNvGrpSpPr/>
+          <p:nvPr/>
+        </p:nvGrpSpPr>
+        <p:grpSpPr>
+          <a:xfrm>
+            <a:off x="1655675" y="1393541"/>
+            <a:ext cx="5832649" cy="5378734"/>
+            <a:chOff x="2627784" y="2348880"/>
+            <a:chExt cx="3888434" cy="3800076"/>
+          </a:xfrm>
+        </p:grpSpPr>
+        <p:pic>
+          <p:nvPicPr>
+            <p:cNvPr id="8" name="Imagem 7" descr="Código QR&#10;&#10;Descrição gerada automaticamente">
+              <a:extLst>
+                <a:ext uri="{FF2B5EF4-FFF2-40B4-BE49-F238E27FC236}">
+                  <a16:creationId xmlns:a16="http://schemas.microsoft.com/office/drawing/2014/main" id="{63BE7ADF-E010-7221-7D75-1284B9BAB08A}"/>
+                </a:ext>
+              </a:extLst>
+            </p:cNvPr>
+            <p:cNvPicPr>
+              <a:picLocks noChangeAspect="1"/>
+            </p:cNvPicPr>
+            <p:nvPr/>
+          </p:nvPicPr>
+          <p:blipFill rotWithShape="1">
+            <a:blip r:embed="rId2">
+              <a:extLst>
+                <a:ext uri="{28A0092B-C50C-407E-A947-70E740481C1C}">
+                  <a14:useLocalDpi xmlns:a14="http://schemas.microsoft.com/office/drawing/2010/main" val="0"/>
+                </a:ext>
+              </a:extLst>
+            </a:blip>
+            <a:srcRect l="23750" t="35300" r="23750" b="13250"/>
+            <a:stretch/>
+          </p:blipFill>
+          <p:spPr>
+            <a:xfrm>
+              <a:off x="2771800" y="2420888"/>
+              <a:ext cx="3600400" cy="3528392"/>
+            </a:xfrm>
+            <a:prstGeom prst="rect">
+              <a:avLst/>
+            </a:prstGeom>
+          </p:spPr>
+        </p:pic>
+        <p:sp>
+          <p:nvSpPr>
+            <p:cNvPr id="9" name="Retângulo 8">
+              <a:extLst>
+                <a:ext uri="{FF2B5EF4-FFF2-40B4-BE49-F238E27FC236}">
+                  <a16:creationId xmlns:a16="http://schemas.microsoft.com/office/drawing/2014/main" id="{097C24A2-8600-2CF9-9B48-60357473DF85}"/>
+                </a:ext>
+              </a:extLst>
+            </p:cNvPr>
+            <p:cNvSpPr/>
+            <p:nvPr/>
+          </p:nvSpPr>
+          <p:spPr>
+            <a:xfrm>
+              <a:off x="2627784" y="2348880"/>
+              <a:ext cx="288032" cy="3728068"/>
+            </a:xfrm>
+            <a:prstGeom prst="rect">
+              <a:avLst/>
+            </a:prstGeom>
+            <a:solidFill>
+              <a:schemeClr val="bg1"/>
+            </a:solidFill>
+            <a:ln>
+              <a:noFill/>
+            </a:ln>
+          </p:spPr>
+          <p:style>
+            <a:lnRef idx="2">
+              <a:schemeClr val="accent1">
+                <a:shade val="15000"/>
+              </a:schemeClr>
+            </a:lnRef>
+            <a:fillRef idx="1">
+              <a:schemeClr val="accent1"/>
+            </a:fillRef>
+            <a:effectRef idx="0">
+              <a:schemeClr val="accent1"/>
+            </a:effectRef>
+            <a:fontRef idx="minor">
+              <a:schemeClr val="lt1"/>
+            </a:fontRef>
+          </p:style>
+          <p:txBody>
+            <a:bodyPr rtlCol="0" anchor="ctr"/>
+            <a:lstStyle/>
+            <a:p>
+              <a:pPr algn="ctr"/>
+              <a:endParaRPr lang="pt-BR"/>
+            </a:p>
+          </p:txBody>
+        </p:sp>
+        <p:sp>
+          <p:nvSpPr>
+            <p:cNvPr id="10" name="Retângulo 9">
+              <a:extLst>
+                <a:ext uri="{FF2B5EF4-FFF2-40B4-BE49-F238E27FC236}">
+                  <a16:creationId xmlns:a16="http://schemas.microsoft.com/office/drawing/2014/main" id="{3344AA47-4C0D-CA2E-2AE6-F93208ACD81A}"/>
+                </a:ext>
+              </a:extLst>
+            </p:cNvPr>
+            <p:cNvSpPr/>
+            <p:nvPr/>
+          </p:nvSpPr>
+          <p:spPr>
+            <a:xfrm>
+              <a:off x="6228186" y="2420888"/>
+              <a:ext cx="288032" cy="3728068"/>
+            </a:xfrm>
+            <a:prstGeom prst="rect">
+              <a:avLst/>
+            </a:prstGeom>
+            <a:solidFill>
+              <a:schemeClr val="bg1"/>
+            </a:solidFill>
+            <a:ln>
+              <a:noFill/>
+            </a:ln>
+          </p:spPr>
+          <p:style>
+            <a:lnRef idx="2">
+              <a:schemeClr val="accent1">
+                <a:shade val="15000"/>
+              </a:schemeClr>
+            </a:lnRef>
+            <a:fillRef idx="1">
+              <a:schemeClr val="accent1"/>
+            </a:fillRef>
+            <a:effectRef idx="0">
+              <a:schemeClr val="accent1"/>
+            </a:effectRef>
+            <a:fontRef idx="minor">
+              <a:schemeClr val="lt1"/>
+            </a:fontRef>
+          </p:style>
+          <p:txBody>
+            <a:bodyPr rtlCol="0" anchor="ctr"/>
+            <a:lstStyle/>
+            <a:p>
+              <a:pPr algn="ctr"/>
+              <a:endParaRPr lang="pt-BR"/>
+            </a:p>
+          </p:txBody>
+        </p:sp>
+      </p:grpSp>
+    </p:spTree>
+    <p:extLst>
+      <p:ext uri="{BB962C8B-B14F-4D97-AF65-F5344CB8AC3E}">
+        <p14:creationId xmlns:p14="http://schemas.microsoft.com/office/powerpoint/2010/main" val="957013914"/>
+      </p:ext>
+    </p:extLst>
+  </p:cSld>
+  <p:clrMapOvr>
+    <a:masterClrMapping/>
+  </p:clrMapOvr>
+</p:sld>
+</file>
+
 <file path=ppt/slides/slide2.xml><?xml version="1.0" encoding="utf-8"?>
 <p:sld xmlns:a="http://schemas.openxmlformats.org/drawingml/2006/main" xmlns:r="http://schemas.openxmlformats.org/officeDocument/2006/relationships" xmlns:p="http://schemas.openxmlformats.org/presentationml/2006/main" showMasterPhAnim="0">
   <p:cSld>
@@ -13464,8 +13740,8 @@
           </a:p>
         </p:txBody>
       </p:sp>
-      <mc:AlternateContent xmlns:mc="http://schemas.openxmlformats.org/markup-compatibility/2006">
-        <mc:Choice xmlns:a14="http://schemas.microsoft.com/office/drawing/2010/main" Requires="a14">
+      <mc:AlternateContent xmlns:mc="http://schemas.openxmlformats.org/markup-compatibility/2006" xmlns:a14="http://schemas.microsoft.com/office/drawing/2010/main">
+        <mc:Choice Requires="a14">
           <p:sp>
             <p:nvSpPr>
               <p:cNvPr id="688320724" name="Retângulo 688320723"/>
@@ -13518,7 +13794,7 @@
             </p:txBody>
           </p:sp>
         </mc:Choice>
-        <mc:Fallback>
+        <mc:Fallback xmlns="">
           <p:sp>
             <p:nvSpPr>
               <p:cNvPr id="688320724" name="Retângulo 688320723"/>

</xml_diff>